<commit_message>
1.2.5 Outfit screen persistent
</commit_message>
<xml_diff>
--- a/FotoAnleitung.pptx
+++ b/FotoAnleitung.pptx
@@ -259,7 +259,7 @@
           <a:p>
             <a:fld id="{7E2D54F6-AE2D-4938-B766-7C019088E91A}" type="datetimeFigureOut">
               <a:rPr lang="de-DE" smtClean="0"/>
-              <a:t>04.01.2026</a:t>
+              <a:t>17.01.2026</a:t>
             </a:fld>
             <a:endParaRPr lang="de-DE"/>
           </a:p>
@@ -457,7 +457,7 @@
           <a:p>
             <a:fld id="{7E2D54F6-AE2D-4938-B766-7C019088E91A}" type="datetimeFigureOut">
               <a:rPr lang="de-DE" smtClean="0"/>
-              <a:t>04.01.2026</a:t>
+              <a:t>17.01.2026</a:t>
             </a:fld>
             <a:endParaRPr lang="de-DE"/>
           </a:p>
@@ -665,7 +665,7 @@
           <a:p>
             <a:fld id="{7E2D54F6-AE2D-4938-B766-7C019088E91A}" type="datetimeFigureOut">
               <a:rPr lang="de-DE" smtClean="0"/>
-              <a:t>04.01.2026</a:t>
+              <a:t>17.01.2026</a:t>
             </a:fld>
             <a:endParaRPr lang="de-DE"/>
           </a:p>
@@ -863,7 +863,7 @@
           <a:p>
             <a:fld id="{7E2D54F6-AE2D-4938-B766-7C019088E91A}" type="datetimeFigureOut">
               <a:rPr lang="de-DE" smtClean="0"/>
-              <a:t>04.01.2026</a:t>
+              <a:t>17.01.2026</a:t>
             </a:fld>
             <a:endParaRPr lang="de-DE"/>
           </a:p>
@@ -1138,7 +1138,7 @@
           <a:p>
             <a:fld id="{7E2D54F6-AE2D-4938-B766-7C019088E91A}" type="datetimeFigureOut">
               <a:rPr lang="de-DE" smtClean="0"/>
-              <a:t>04.01.2026</a:t>
+              <a:t>17.01.2026</a:t>
             </a:fld>
             <a:endParaRPr lang="de-DE"/>
           </a:p>
@@ -1403,7 +1403,7 @@
           <a:p>
             <a:fld id="{7E2D54F6-AE2D-4938-B766-7C019088E91A}" type="datetimeFigureOut">
               <a:rPr lang="de-DE" smtClean="0"/>
-              <a:t>04.01.2026</a:t>
+              <a:t>17.01.2026</a:t>
             </a:fld>
             <a:endParaRPr lang="de-DE"/>
           </a:p>
@@ -1815,7 +1815,7 @@
           <a:p>
             <a:fld id="{7E2D54F6-AE2D-4938-B766-7C019088E91A}" type="datetimeFigureOut">
               <a:rPr lang="de-DE" smtClean="0"/>
-              <a:t>04.01.2026</a:t>
+              <a:t>17.01.2026</a:t>
             </a:fld>
             <a:endParaRPr lang="de-DE"/>
           </a:p>
@@ -1956,7 +1956,7 @@
           <a:p>
             <a:fld id="{7E2D54F6-AE2D-4938-B766-7C019088E91A}" type="datetimeFigureOut">
               <a:rPr lang="de-DE" smtClean="0"/>
-              <a:t>04.01.2026</a:t>
+              <a:t>17.01.2026</a:t>
             </a:fld>
             <a:endParaRPr lang="de-DE"/>
           </a:p>
@@ -2069,7 +2069,7 @@
           <a:p>
             <a:fld id="{7E2D54F6-AE2D-4938-B766-7C019088E91A}" type="datetimeFigureOut">
               <a:rPr lang="de-DE" smtClean="0"/>
-              <a:t>04.01.2026</a:t>
+              <a:t>17.01.2026</a:t>
             </a:fld>
             <a:endParaRPr lang="de-DE"/>
           </a:p>
@@ -2380,7 +2380,7 @@
           <a:p>
             <a:fld id="{7E2D54F6-AE2D-4938-B766-7C019088E91A}" type="datetimeFigureOut">
               <a:rPr lang="de-DE" smtClean="0"/>
-              <a:t>04.01.2026</a:t>
+              <a:t>17.01.2026</a:t>
             </a:fld>
             <a:endParaRPr lang="de-DE"/>
           </a:p>
@@ -2668,7 +2668,7 @@
           <a:p>
             <a:fld id="{7E2D54F6-AE2D-4938-B766-7C019088E91A}" type="datetimeFigureOut">
               <a:rPr lang="de-DE" smtClean="0"/>
-              <a:t>04.01.2026</a:t>
+              <a:t>17.01.2026</a:t>
             </a:fld>
             <a:endParaRPr lang="de-DE"/>
           </a:p>
@@ -2909,7 +2909,7 @@
           <a:p>
             <a:fld id="{7E2D54F6-AE2D-4938-B766-7C019088E91A}" type="datetimeFigureOut">
               <a:rPr lang="de-DE" smtClean="0"/>
-              <a:t>04.01.2026</a:t>
+              <a:t>17.01.2026</a:t>
             </a:fld>
             <a:endParaRPr lang="de-DE"/>
           </a:p>
@@ -3489,8 +3489,8 @@
         </p:nvSpPr>
         <p:spPr>
           <a:xfrm>
-            <a:off x="5467739" y="4275079"/>
-            <a:ext cx="2537926" cy="2087873"/>
+            <a:off x="5467739" y="5684161"/>
+            <a:ext cx="2537926" cy="678791"/>
           </a:xfrm>
           <a:prstGeom prst="rect">
             <a:avLst/>
@@ -3633,8 +3633,8 @@
         </p:nvSpPr>
         <p:spPr>
           <a:xfrm rot="16200000">
-            <a:off x="4323788" y="5189455"/>
-            <a:ext cx="1823774" cy="523220"/>
+            <a:off x="4610787" y="5476454"/>
+            <a:ext cx="1249776" cy="523220"/>
           </a:xfrm>
           <a:prstGeom prst="rect">
             <a:avLst/>

</xml_diff>